<commit_message>
Ajout du projet bloc 0
</commit_message>
<xml_diff>
--- a/PROJET_BLOC_0_Geoffroy_Djehonnon.pptx
+++ b/PROJET_BLOC_0_Geoffroy_Djehonnon.pptx
@@ -316,7 +316,7 @@
           <a:p>
             <a:fld id="{5BCAD085-E8A6-8845-BD4E-CB4CCA059FC4}" type="datetimeFigureOut">
               <a:rPr lang="en-US" smtClean="0"/>
-              <a:t>2/18/2026</a:t>
+              <a:t>2/19/2026</a:t>
             </a:fld>
             <a:endParaRPr lang="en-US"/>
           </a:p>
@@ -484,7 +484,7 @@
           <a:p>
             <a:fld id="{5BCAD085-E8A6-8845-BD4E-CB4CCA059FC4}" type="datetimeFigureOut">
               <a:rPr lang="en-US" smtClean="0"/>
-              <a:t>2/18/2026</a:t>
+              <a:t>2/19/2026</a:t>
             </a:fld>
             <a:endParaRPr lang="en-US"/>
           </a:p>
@@ -662,7 +662,7 @@
           <a:p>
             <a:fld id="{5BCAD085-E8A6-8845-BD4E-CB4CCA059FC4}" type="datetimeFigureOut">
               <a:rPr lang="en-US" smtClean="0"/>
-              <a:t>2/18/2026</a:t>
+              <a:t>2/19/2026</a:t>
             </a:fld>
             <a:endParaRPr lang="en-US"/>
           </a:p>
@@ -830,7 +830,7 @@
           <a:p>
             <a:fld id="{5BCAD085-E8A6-8845-BD4E-CB4CCA059FC4}" type="datetimeFigureOut">
               <a:rPr lang="en-US" smtClean="0"/>
-              <a:t>2/18/2026</a:t>
+              <a:t>2/19/2026</a:t>
             </a:fld>
             <a:endParaRPr lang="en-US"/>
           </a:p>
@@ -1075,7 +1075,7 @@
           <a:p>
             <a:fld id="{5BCAD085-E8A6-8845-BD4E-CB4CCA059FC4}" type="datetimeFigureOut">
               <a:rPr lang="en-US" smtClean="0"/>
-              <a:t>2/18/2026</a:t>
+              <a:t>2/19/2026</a:t>
             </a:fld>
             <a:endParaRPr lang="en-US"/>
           </a:p>
@@ -1360,7 +1360,7 @@
           <a:p>
             <a:fld id="{5BCAD085-E8A6-8845-BD4E-CB4CCA059FC4}" type="datetimeFigureOut">
               <a:rPr lang="en-US" smtClean="0"/>
-              <a:t>2/18/2026</a:t>
+              <a:t>2/19/2026</a:t>
             </a:fld>
             <a:endParaRPr lang="en-US"/>
           </a:p>
@@ -1779,7 +1779,7 @@
           <a:p>
             <a:fld id="{5BCAD085-E8A6-8845-BD4E-CB4CCA059FC4}" type="datetimeFigureOut">
               <a:rPr lang="en-US" smtClean="0"/>
-              <a:t>2/18/2026</a:t>
+              <a:t>2/19/2026</a:t>
             </a:fld>
             <a:endParaRPr lang="en-US"/>
           </a:p>
@@ -1896,7 +1896,7 @@
           <a:p>
             <a:fld id="{5BCAD085-E8A6-8845-BD4E-CB4CCA059FC4}" type="datetimeFigureOut">
               <a:rPr lang="en-US" smtClean="0"/>
-              <a:t>2/18/2026</a:t>
+              <a:t>2/19/2026</a:t>
             </a:fld>
             <a:endParaRPr lang="en-US"/>
           </a:p>
@@ -1991,7 +1991,7 @@
           <a:p>
             <a:fld id="{5BCAD085-E8A6-8845-BD4E-CB4CCA059FC4}" type="datetimeFigureOut">
               <a:rPr lang="en-US" smtClean="0"/>
-              <a:t>2/18/2026</a:t>
+              <a:t>2/19/2026</a:t>
             </a:fld>
             <a:endParaRPr lang="en-US"/>
           </a:p>
@@ -2266,7 +2266,7 @@
           <a:p>
             <a:fld id="{5BCAD085-E8A6-8845-BD4E-CB4CCA059FC4}" type="datetimeFigureOut">
               <a:rPr lang="en-US" smtClean="0"/>
-              <a:t>2/18/2026</a:t>
+              <a:t>2/19/2026</a:t>
             </a:fld>
             <a:endParaRPr lang="en-US"/>
           </a:p>
@@ -2518,7 +2518,7 @@
           <a:p>
             <a:fld id="{5BCAD085-E8A6-8845-BD4E-CB4CCA059FC4}" type="datetimeFigureOut">
               <a:rPr lang="en-US" smtClean="0"/>
-              <a:t>2/18/2026</a:t>
+              <a:t>2/19/2026</a:t>
             </a:fld>
             <a:endParaRPr lang="en-US"/>
           </a:p>
@@ -2729,7 +2729,7 @@
           <a:p>
             <a:fld id="{5BCAD085-E8A6-8845-BD4E-CB4CCA059FC4}" type="datetimeFigureOut">
               <a:rPr lang="en-US" smtClean="0"/>
-              <a:t>2/18/2026</a:t>
+              <a:t>2/19/2026</a:t>
             </a:fld>
             <a:endParaRPr lang="en-US"/>
           </a:p>
@@ -4457,6 +4457,7 @@
                 </a:solidFill>
                 <a:effectLst/>
                 <a:latin typeface="Agency FB" panose="020B0503020202020204" pitchFamily="34" charset="0"/>
+                <a:hlinkClick r:id="rId2"/>
               </a:rPr>
               <a:t>https://github.com/votre-nom/votre-projet</a:t>
             </a:r>

</xml_diff>